<commit_message>
post meeting July 17
</commit_message>
<xml_diff>
--- a/GADGET_Blueprint_1.pptx
+++ b/GADGET_Blueprint_1.pptx
@@ -4,6 +4,9 @@
   <p:sldMasterIdLst>
     <p:sldMasterId id="2147483648" r:id="rId1"/>
   </p:sldMasterIdLst>
+  <p:notesMasterIdLst>
+    <p:notesMasterId r:id="rId12"/>
+  </p:notesMasterIdLst>
   <p:sldIdLst>
     <p:sldId id="262" r:id="rId2"/>
     <p:sldId id="258" r:id="rId3"/>
@@ -124,7 +127,7 @@
 <file path=ppt/revisionInfo.xml><?xml version="1.0" encoding="utf-8"?>
 <p1510:revInfo xmlns:a="http://schemas.openxmlformats.org/drawingml/2006/main" xmlns:r="http://schemas.openxmlformats.org/officeDocument/2006/relationships" xmlns:p1510="http://schemas.microsoft.com/office/powerpoint/2015/10/main">
   <p1510:revLst>
-    <p1510:client id="{904EA3BE-E951-4442-9925-9ECA9C6DAF99}" v="17" dt="2023-07-17T14:04:28.161"/>
+    <p1510:client id="{904EA3BE-E951-4442-9925-9ECA9C6DAF99}" v="246" dt="2023-07-17T16:42:13.435"/>
   </p1510:revLst>
 </p1510:revInfo>
 </file>
@@ -133,8 +136,8 @@
 <pc:chgInfo xmlns:a="http://schemas.openxmlformats.org/drawingml/2006/main" xmlns:r="http://schemas.openxmlformats.org/officeDocument/2006/relationships" xmlns:ac="http://schemas.microsoft.com/office/drawing/2013/main/command" xmlns:pc="http://schemas.microsoft.com/office/powerpoint/2013/main/command">
   <pc:docChgLst>
     <pc:chgData name="Sheharyar Raza" userId="6296120c-4620-4e6e-b0cf-8bfa191d4497" providerId="ADAL" clId="{904EA3BE-E951-4442-9925-9ECA9C6DAF99}"/>
-    <pc:docChg chg="undo custSel addSld delSld modSld sldOrd">
-      <pc:chgData name="Sheharyar Raza" userId="6296120c-4620-4e6e-b0cf-8bfa191d4497" providerId="ADAL" clId="{904EA3BE-E951-4442-9925-9ECA9C6DAF99}" dt="2023-07-17T14:08:06.979" v="5029" actId="20577"/>
+    <pc:docChg chg="undo custSel addSld delSld modSld sldOrd modShowInfo">
+      <pc:chgData name="Sheharyar Raza" userId="6296120c-4620-4e6e-b0cf-8bfa191d4497" providerId="ADAL" clId="{904EA3BE-E951-4442-9925-9ECA9C6DAF99}" dt="2023-07-17T16:49:43.737" v="5792" actId="20577"/>
       <pc:docMkLst>
         <pc:docMk/>
       </pc:docMkLst>
@@ -145,8 +148,8 @@
           <pc:sldMk cId="2650380005" sldId="256"/>
         </pc:sldMkLst>
       </pc:sldChg>
-      <pc:sldChg chg="delSp modSp add mod ord modAnim">
-        <pc:chgData name="Sheharyar Raza" userId="6296120c-4620-4e6e-b0cf-8bfa191d4497" providerId="ADAL" clId="{904EA3BE-E951-4442-9925-9ECA9C6DAF99}" dt="2023-07-17T14:00:31.230" v="4873" actId="20577"/>
+      <pc:sldChg chg="delSp modSp add mod ord modAnim modNotesTx">
+        <pc:chgData name="Sheharyar Raza" userId="6296120c-4620-4e6e-b0cf-8bfa191d4497" providerId="ADAL" clId="{904EA3BE-E951-4442-9925-9ECA9C6DAF99}" dt="2023-07-17T16:34:29.081" v="5471" actId="20577"/>
         <pc:sldMkLst>
           <pc:docMk/>
           <pc:sldMk cId="3307915255" sldId="257"/>
@@ -176,7 +179,7 @@
           </ac:spMkLst>
         </pc:spChg>
         <pc:spChg chg="mod">
-          <ac:chgData name="Sheharyar Raza" userId="6296120c-4620-4e6e-b0cf-8bfa191d4497" providerId="ADAL" clId="{904EA3BE-E951-4442-9925-9ECA9C6DAF99}" dt="2023-07-17T13:59:38.814" v="4862" actId="20577"/>
+          <ac:chgData name="Sheharyar Raza" userId="6296120c-4620-4e6e-b0cf-8bfa191d4497" providerId="ADAL" clId="{904EA3BE-E951-4442-9925-9ECA9C6DAF99}" dt="2023-07-17T16:34:29.081" v="5471" actId="20577"/>
           <ac:spMkLst>
             <pc:docMk/>
             <pc:sldMk cId="3307915255" sldId="257"/>
@@ -184,8 +187,8 @@
           </ac:spMkLst>
         </pc:spChg>
       </pc:sldChg>
-      <pc:sldChg chg="delSp modSp add mod ord modAnim">
-        <pc:chgData name="Sheharyar Raza" userId="6296120c-4620-4e6e-b0cf-8bfa191d4497" providerId="ADAL" clId="{904EA3BE-E951-4442-9925-9ECA9C6DAF99}" dt="2023-07-17T13:59:54.648" v="4863"/>
+      <pc:sldChg chg="delSp modSp add mod ord modAnim modNotesTx">
+        <pc:chgData name="Sheharyar Raza" userId="6296120c-4620-4e6e-b0cf-8bfa191d4497" providerId="ADAL" clId="{904EA3BE-E951-4442-9925-9ECA9C6DAF99}" dt="2023-07-17T16:21:02.464" v="5254" actId="207"/>
         <pc:sldMkLst>
           <pc:docMk/>
           <pc:sldMk cId="2998437829" sldId="258"/>
@@ -215,7 +218,7 @@
           </ac:spMkLst>
         </pc:spChg>
         <pc:spChg chg="mod">
-          <ac:chgData name="Sheharyar Raza" userId="6296120c-4620-4e6e-b0cf-8bfa191d4497" providerId="ADAL" clId="{904EA3BE-E951-4442-9925-9ECA9C6DAF99}" dt="2023-07-07T14:35:14.084" v="85" actId="1076"/>
+          <ac:chgData name="Sheharyar Raza" userId="6296120c-4620-4e6e-b0cf-8bfa191d4497" providerId="ADAL" clId="{904EA3BE-E951-4442-9925-9ECA9C6DAF99}" dt="2023-07-17T15:58:05.520" v="5043" actId="14100"/>
           <ac:spMkLst>
             <pc:docMk/>
             <pc:sldMk cId="2998437829" sldId="258"/>
@@ -223,7 +226,7 @@
           </ac:spMkLst>
         </pc:spChg>
         <pc:spChg chg="mod">
-          <ac:chgData name="Sheharyar Raza" userId="6296120c-4620-4e6e-b0cf-8bfa191d4497" providerId="ADAL" clId="{904EA3BE-E951-4442-9925-9ECA9C6DAF99}" dt="2023-07-07T14:35:14.084" v="85" actId="1076"/>
+          <ac:chgData name="Sheharyar Raza" userId="6296120c-4620-4e6e-b0cf-8bfa191d4497" providerId="ADAL" clId="{904EA3BE-E951-4442-9925-9ECA9C6DAF99}" dt="2023-07-17T16:21:02.464" v="5254" actId="207"/>
           <ac:spMkLst>
             <pc:docMk/>
             <pc:sldMk cId="2998437829" sldId="258"/>
@@ -231,8 +234,8 @@
           </ac:spMkLst>
         </pc:spChg>
       </pc:sldChg>
-      <pc:sldChg chg="addSp delSp modSp add mod ord modAnim">
-        <pc:chgData name="Sheharyar Raza" userId="6296120c-4620-4e6e-b0cf-8bfa191d4497" providerId="ADAL" clId="{904EA3BE-E951-4442-9925-9ECA9C6DAF99}" dt="2023-07-17T14:04:28.161" v="4943"/>
+      <pc:sldChg chg="addSp delSp modSp add mod ord modAnim modNotesTx">
+        <pc:chgData name="Sheharyar Raza" userId="6296120c-4620-4e6e-b0cf-8bfa191d4497" providerId="ADAL" clId="{904EA3BE-E951-4442-9925-9ECA9C6DAF99}" dt="2023-07-17T16:49:43.737" v="5792" actId="20577"/>
         <pc:sldMkLst>
           <pc:docMk/>
           <pc:sldMk cId="2881327137" sldId="259"/>
@@ -262,7 +265,7 @@
           </ac:spMkLst>
         </pc:spChg>
         <pc:spChg chg="add mod">
-          <ac:chgData name="Sheharyar Raza" userId="6296120c-4620-4e6e-b0cf-8bfa191d4497" providerId="ADAL" clId="{904EA3BE-E951-4442-9925-9ECA9C6DAF99}" dt="2023-07-07T18:03:49.664" v="4706" actId="20577"/>
+          <ac:chgData name="Sheharyar Raza" userId="6296120c-4620-4e6e-b0cf-8bfa191d4497" providerId="ADAL" clId="{904EA3BE-E951-4442-9925-9ECA9C6DAF99}" dt="2023-07-17T16:42:13.435" v="5623" actId="20577"/>
           <ac:spMkLst>
             <pc:docMk/>
             <pc:sldMk cId="2881327137" sldId="259"/>
@@ -554,6 +557,660 @@
     </pc:docChg>
   </pc:docChgLst>
 </pc:chgInfo>
+</file>
+
+<file path=ppt/notesMasters/notesMaster1.xml><?xml version="1.0" encoding="utf-8"?>
+<p:notesMaster xmlns:a="http://schemas.openxmlformats.org/drawingml/2006/main" xmlns:r="http://schemas.openxmlformats.org/officeDocument/2006/relationships" xmlns:p="http://schemas.openxmlformats.org/presentationml/2006/main">
+  <p:cSld>
+    <p:bg>
+      <p:bgRef idx="1001">
+        <a:schemeClr val="bg1"/>
+      </p:bgRef>
+    </p:bg>
+    <p:spTree>
+      <p:nvGrpSpPr>
+        <p:cNvPr id="1" name=""/>
+        <p:cNvGrpSpPr/>
+        <p:nvPr/>
+      </p:nvGrpSpPr>
+      <p:grpSpPr>
+        <a:xfrm>
+          <a:off x="0" y="0"/>
+          <a:ext cx="0" cy="0"/>
+          <a:chOff x="0" y="0"/>
+          <a:chExt cx="0" cy="0"/>
+        </a:xfrm>
+      </p:grpSpPr>
+      <p:sp>
+        <p:nvSpPr>
+          <p:cNvPr id="2" name="Header Placeholder 1"/>
+          <p:cNvSpPr>
+            <a:spLocks noGrp="1"/>
+          </p:cNvSpPr>
+          <p:nvPr>
+            <p:ph type="hdr" sz="quarter"/>
+          </p:nvPr>
+        </p:nvSpPr>
+        <p:spPr>
+          <a:xfrm>
+            <a:off x="0" y="0"/>
+            <a:ext cx="2971800" cy="458788"/>
+          </a:xfrm>
+          <a:prstGeom prst="rect">
+            <a:avLst/>
+          </a:prstGeom>
+        </p:spPr>
+        <p:txBody>
+          <a:bodyPr vert="horz" lIns="91440" tIns="45720" rIns="91440" bIns="45720" rtlCol="0"/>
+          <a:lstStyle>
+            <a:lvl1pPr algn="l">
+              <a:defRPr sz="1200"/>
+            </a:lvl1pPr>
+          </a:lstStyle>
+          <a:p>
+            <a:endParaRPr lang="en-US"/>
+          </a:p>
+        </p:txBody>
+      </p:sp>
+      <p:sp>
+        <p:nvSpPr>
+          <p:cNvPr id="3" name="Date Placeholder 2"/>
+          <p:cNvSpPr>
+            <a:spLocks noGrp="1"/>
+          </p:cNvSpPr>
+          <p:nvPr>
+            <p:ph type="dt" idx="1"/>
+          </p:nvPr>
+        </p:nvSpPr>
+        <p:spPr>
+          <a:xfrm>
+            <a:off x="3884613" y="0"/>
+            <a:ext cx="2971800" cy="458788"/>
+          </a:xfrm>
+          <a:prstGeom prst="rect">
+            <a:avLst/>
+          </a:prstGeom>
+        </p:spPr>
+        <p:txBody>
+          <a:bodyPr vert="horz" lIns="91440" tIns="45720" rIns="91440" bIns="45720" rtlCol="0"/>
+          <a:lstStyle>
+            <a:lvl1pPr algn="r">
+              <a:defRPr sz="1200"/>
+            </a:lvl1pPr>
+          </a:lstStyle>
+          <a:p>
+            <a:fld id="{79942096-D6B4-48E3-A07F-83C36308E102}" type="datetimeFigureOut">
+              <a:rPr lang="en-US" smtClean="0"/>
+              <a:t>2023-07-17</a:t>
+            </a:fld>
+            <a:endParaRPr lang="en-US"/>
+          </a:p>
+        </p:txBody>
+      </p:sp>
+      <p:sp>
+        <p:nvSpPr>
+          <p:cNvPr id="4" name="Slide Image Placeholder 3"/>
+          <p:cNvSpPr>
+            <a:spLocks noGrp="1" noRot="1" noChangeAspect="1"/>
+          </p:cNvSpPr>
+          <p:nvPr>
+            <p:ph type="sldImg" idx="2"/>
+          </p:nvPr>
+        </p:nvSpPr>
+        <p:spPr>
+          <a:xfrm>
+            <a:off x="685800" y="1143000"/>
+            <a:ext cx="5486400" cy="3086100"/>
+          </a:xfrm>
+          <a:prstGeom prst="rect">
+            <a:avLst/>
+          </a:prstGeom>
+          <a:noFill/>
+          <a:ln w="12700">
+            <a:solidFill>
+              <a:prstClr val="black"/>
+            </a:solidFill>
+          </a:ln>
+        </p:spPr>
+        <p:txBody>
+          <a:bodyPr vert="horz" lIns="91440" tIns="45720" rIns="91440" bIns="45720" rtlCol="0" anchor="ctr"/>
+          <a:lstStyle/>
+          <a:p>
+            <a:endParaRPr lang="en-US"/>
+          </a:p>
+        </p:txBody>
+      </p:sp>
+      <p:sp>
+        <p:nvSpPr>
+          <p:cNvPr id="5" name="Notes Placeholder 4"/>
+          <p:cNvSpPr>
+            <a:spLocks noGrp="1"/>
+          </p:cNvSpPr>
+          <p:nvPr>
+            <p:ph type="body" sz="quarter" idx="3"/>
+          </p:nvPr>
+        </p:nvSpPr>
+        <p:spPr>
+          <a:xfrm>
+            <a:off x="685800" y="4400550"/>
+            <a:ext cx="5486400" cy="3600450"/>
+          </a:xfrm>
+          <a:prstGeom prst="rect">
+            <a:avLst/>
+          </a:prstGeom>
+        </p:spPr>
+        <p:txBody>
+          <a:bodyPr vert="horz" lIns="91440" tIns="45720" rIns="91440" bIns="45720" rtlCol="0"/>
+          <a:lstStyle/>
+          <a:p>
+            <a:pPr lvl="0"/>
+            <a:r>
+              <a:rPr lang="en-US"/>
+              <a:t>Click to edit Master text styles</a:t>
+            </a:r>
+          </a:p>
+          <a:p>
+            <a:pPr lvl="1"/>
+            <a:r>
+              <a:rPr lang="en-US"/>
+              <a:t>Second level</a:t>
+            </a:r>
+          </a:p>
+          <a:p>
+            <a:pPr lvl="2"/>
+            <a:r>
+              <a:rPr lang="en-US"/>
+              <a:t>Third level</a:t>
+            </a:r>
+          </a:p>
+          <a:p>
+            <a:pPr lvl="3"/>
+            <a:r>
+              <a:rPr lang="en-US"/>
+              <a:t>Fourth level</a:t>
+            </a:r>
+          </a:p>
+          <a:p>
+            <a:pPr lvl="4"/>
+            <a:r>
+              <a:rPr lang="en-US"/>
+              <a:t>Fifth level</a:t>
+            </a:r>
+          </a:p>
+        </p:txBody>
+      </p:sp>
+      <p:sp>
+        <p:nvSpPr>
+          <p:cNvPr id="6" name="Footer Placeholder 5"/>
+          <p:cNvSpPr>
+            <a:spLocks noGrp="1"/>
+          </p:cNvSpPr>
+          <p:nvPr>
+            <p:ph type="ftr" sz="quarter" idx="4"/>
+          </p:nvPr>
+        </p:nvSpPr>
+        <p:spPr>
+          <a:xfrm>
+            <a:off x="0" y="8685213"/>
+            <a:ext cx="2971800" cy="458787"/>
+          </a:xfrm>
+          <a:prstGeom prst="rect">
+            <a:avLst/>
+          </a:prstGeom>
+        </p:spPr>
+        <p:txBody>
+          <a:bodyPr vert="horz" lIns="91440" tIns="45720" rIns="91440" bIns="45720" rtlCol="0" anchor="b"/>
+          <a:lstStyle>
+            <a:lvl1pPr algn="l">
+              <a:defRPr sz="1200"/>
+            </a:lvl1pPr>
+          </a:lstStyle>
+          <a:p>
+            <a:endParaRPr lang="en-US"/>
+          </a:p>
+        </p:txBody>
+      </p:sp>
+      <p:sp>
+        <p:nvSpPr>
+          <p:cNvPr id="7" name="Slide Number Placeholder 6"/>
+          <p:cNvSpPr>
+            <a:spLocks noGrp="1"/>
+          </p:cNvSpPr>
+          <p:nvPr>
+            <p:ph type="sldNum" sz="quarter" idx="5"/>
+          </p:nvPr>
+        </p:nvSpPr>
+        <p:spPr>
+          <a:xfrm>
+            <a:off x="3884613" y="8685213"/>
+            <a:ext cx="2971800" cy="458787"/>
+          </a:xfrm>
+          <a:prstGeom prst="rect">
+            <a:avLst/>
+          </a:prstGeom>
+        </p:spPr>
+        <p:txBody>
+          <a:bodyPr vert="horz" lIns="91440" tIns="45720" rIns="91440" bIns="45720" rtlCol="0" anchor="b"/>
+          <a:lstStyle>
+            <a:lvl1pPr algn="r">
+              <a:defRPr sz="1200"/>
+            </a:lvl1pPr>
+          </a:lstStyle>
+          <a:p>
+            <a:fld id="{4E3C8D0D-8C50-44EE-9866-8D7C8A5FBCD8}" type="slidenum">
+              <a:rPr lang="en-US" smtClean="0"/>
+              <a:t>‹#›</a:t>
+            </a:fld>
+            <a:endParaRPr lang="en-US"/>
+          </a:p>
+        </p:txBody>
+      </p:sp>
+    </p:spTree>
+    <p:extLst>
+      <p:ext uri="{BB962C8B-B14F-4D97-AF65-F5344CB8AC3E}">
+        <p14:creationId xmlns:p14="http://schemas.microsoft.com/office/powerpoint/2010/main" val="1494209500"/>
+      </p:ext>
+    </p:extLst>
+  </p:cSld>
+  <p:clrMap bg1="lt1" tx1="dk1" bg2="lt2" tx2="dk2" accent1="accent1" accent2="accent2" accent3="accent3" accent4="accent4" accent5="accent5" accent6="accent6" hlink="hlink" folHlink="folHlink"/>
+  <p:notesStyle>
+    <a:lvl1pPr marL="0" algn="l" defTabSz="914400" rtl="0" eaLnBrk="1" latinLnBrk="0" hangingPunct="1">
+      <a:defRPr sz="1200" kern="1200">
+        <a:solidFill>
+          <a:schemeClr val="tx1"/>
+        </a:solidFill>
+        <a:latin typeface="+mn-lt"/>
+        <a:ea typeface="+mn-ea"/>
+        <a:cs typeface="+mn-cs"/>
+      </a:defRPr>
+    </a:lvl1pPr>
+    <a:lvl2pPr marL="457200" algn="l" defTabSz="914400" rtl="0" eaLnBrk="1" latinLnBrk="0" hangingPunct="1">
+      <a:defRPr sz="1200" kern="1200">
+        <a:solidFill>
+          <a:schemeClr val="tx1"/>
+        </a:solidFill>
+        <a:latin typeface="+mn-lt"/>
+        <a:ea typeface="+mn-ea"/>
+        <a:cs typeface="+mn-cs"/>
+      </a:defRPr>
+    </a:lvl2pPr>
+    <a:lvl3pPr marL="914400" algn="l" defTabSz="914400" rtl="0" eaLnBrk="1" latinLnBrk="0" hangingPunct="1">
+      <a:defRPr sz="1200" kern="1200">
+        <a:solidFill>
+          <a:schemeClr val="tx1"/>
+        </a:solidFill>
+        <a:latin typeface="+mn-lt"/>
+        <a:ea typeface="+mn-ea"/>
+        <a:cs typeface="+mn-cs"/>
+      </a:defRPr>
+    </a:lvl3pPr>
+    <a:lvl4pPr marL="1371600" algn="l" defTabSz="914400" rtl="0" eaLnBrk="1" latinLnBrk="0" hangingPunct="1">
+      <a:defRPr sz="1200" kern="1200">
+        <a:solidFill>
+          <a:schemeClr val="tx1"/>
+        </a:solidFill>
+        <a:latin typeface="+mn-lt"/>
+        <a:ea typeface="+mn-ea"/>
+        <a:cs typeface="+mn-cs"/>
+      </a:defRPr>
+    </a:lvl4pPr>
+    <a:lvl5pPr marL="1828800" algn="l" defTabSz="914400" rtl="0" eaLnBrk="1" latinLnBrk="0" hangingPunct="1">
+      <a:defRPr sz="1200" kern="1200">
+        <a:solidFill>
+          <a:schemeClr val="tx1"/>
+        </a:solidFill>
+        <a:latin typeface="+mn-lt"/>
+        <a:ea typeface="+mn-ea"/>
+        <a:cs typeface="+mn-cs"/>
+      </a:defRPr>
+    </a:lvl5pPr>
+    <a:lvl6pPr marL="2286000" algn="l" defTabSz="914400" rtl="0" eaLnBrk="1" latinLnBrk="0" hangingPunct="1">
+      <a:defRPr sz="1200" kern="1200">
+        <a:solidFill>
+          <a:schemeClr val="tx1"/>
+        </a:solidFill>
+        <a:latin typeface="+mn-lt"/>
+        <a:ea typeface="+mn-ea"/>
+        <a:cs typeface="+mn-cs"/>
+      </a:defRPr>
+    </a:lvl6pPr>
+    <a:lvl7pPr marL="2743200" algn="l" defTabSz="914400" rtl="0" eaLnBrk="1" latinLnBrk="0" hangingPunct="1">
+      <a:defRPr sz="1200" kern="1200">
+        <a:solidFill>
+          <a:schemeClr val="tx1"/>
+        </a:solidFill>
+        <a:latin typeface="+mn-lt"/>
+        <a:ea typeface="+mn-ea"/>
+        <a:cs typeface="+mn-cs"/>
+      </a:defRPr>
+    </a:lvl7pPr>
+    <a:lvl8pPr marL="3200400" algn="l" defTabSz="914400" rtl="0" eaLnBrk="1" latinLnBrk="0" hangingPunct="1">
+      <a:defRPr sz="1200" kern="1200">
+        <a:solidFill>
+          <a:schemeClr val="tx1"/>
+        </a:solidFill>
+        <a:latin typeface="+mn-lt"/>
+        <a:ea typeface="+mn-ea"/>
+        <a:cs typeface="+mn-cs"/>
+      </a:defRPr>
+    </a:lvl8pPr>
+    <a:lvl9pPr marL="3657600" algn="l" defTabSz="914400" rtl="0" eaLnBrk="1" latinLnBrk="0" hangingPunct="1">
+      <a:defRPr sz="1200" kern="1200">
+        <a:solidFill>
+          <a:schemeClr val="tx1"/>
+        </a:solidFill>
+        <a:latin typeface="+mn-lt"/>
+        <a:ea typeface="+mn-ea"/>
+        <a:cs typeface="+mn-cs"/>
+      </a:defRPr>
+    </a:lvl9pPr>
+  </p:notesStyle>
+</p:notesMaster>
+</file>
+
+<file path=ppt/notesSlides/notesSlide1.xml><?xml version="1.0" encoding="utf-8"?>
+<p:notes xmlns:a="http://schemas.openxmlformats.org/drawingml/2006/main" xmlns:r="http://schemas.openxmlformats.org/officeDocument/2006/relationships" xmlns:p="http://schemas.openxmlformats.org/presentationml/2006/main">
+  <p:cSld>
+    <p:spTree>
+      <p:nvGrpSpPr>
+        <p:cNvPr id="1" name=""/>
+        <p:cNvGrpSpPr/>
+        <p:nvPr/>
+      </p:nvGrpSpPr>
+      <p:grpSpPr>
+        <a:xfrm>
+          <a:off x="0" y="0"/>
+          <a:ext cx="0" cy="0"/>
+          <a:chOff x="0" y="0"/>
+          <a:chExt cx="0" cy="0"/>
+        </a:xfrm>
+      </p:grpSpPr>
+      <p:sp>
+        <p:nvSpPr>
+          <p:cNvPr id="2" name="Slide Image Placeholder 1"/>
+          <p:cNvSpPr>
+            <a:spLocks noGrp="1" noRot="1" noChangeAspect="1"/>
+          </p:cNvSpPr>
+          <p:nvPr>
+            <p:ph type="sldImg"/>
+          </p:nvPr>
+        </p:nvSpPr>
+        <p:spPr/>
+      </p:sp>
+      <p:sp>
+        <p:nvSpPr>
+          <p:cNvPr id="3" name="Notes Placeholder 2"/>
+          <p:cNvSpPr>
+            <a:spLocks noGrp="1"/>
+          </p:cNvSpPr>
+          <p:nvPr>
+            <p:ph type="body" idx="1"/>
+          </p:nvPr>
+        </p:nvSpPr>
+        <p:spPr/>
+        <p:txBody>
+          <a:bodyPr/>
+          <a:lstStyle/>
+          <a:p>
+            <a:r>
+              <a:rPr lang="en-CA" dirty="0"/>
+              <a:t>Q. are ICU docs included? Do we know setting of practice?</a:t>
+            </a:r>
+          </a:p>
+          <a:p>
+            <a:r>
+              <a:rPr lang="en-CA" dirty="0"/>
+              <a:t>Q. Available physician characteristics</a:t>
+            </a:r>
+          </a:p>
+          <a:p>
+            <a:endParaRPr lang="en-US" dirty="0"/>
+          </a:p>
+        </p:txBody>
+      </p:sp>
+      <p:sp>
+        <p:nvSpPr>
+          <p:cNvPr id="4" name="Slide Number Placeholder 3"/>
+          <p:cNvSpPr>
+            <a:spLocks noGrp="1"/>
+          </p:cNvSpPr>
+          <p:nvPr>
+            <p:ph type="sldNum" sz="quarter" idx="5"/>
+          </p:nvPr>
+        </p:nvSpPr>
+        <p:spPr/>
+        <p:txBody>
+          <a:bodyPr/>
+          <a:lstStyle/>
+          <a:p>
+            <a:fld id="{4E3C8D0D-8C50-44EE-9866-8D7C8A5FBCD8}" type="slidenum">
+              <a:rPr lang="en-US" smtClean="0"/>
+              <a:t>2</a:t>
+            </a:fld>
+            <a:endParaRPr lang="en-US"/>
+          </a:p>
+        </p:txBody>
+      </p:sp>
+    </p:spTree>
+    <p:extLst>
+      <p:ext uri="{BB962C8B-B14F-4D97-AF65-F5344CB8AC3E}">
+        <p14:creationId xmlns:p14="http://schemas.microsoft.com/office/powerpoint/2010/main" val="1069462238"/>
+      </p:ext>
+    </p:extLst>
+  </p:cSld>
+  <p:clrMapOvr>
+    <a:masterClrMapping/>
+  </p:clrMapOvr>
+</p:notes>
+</file>
+
+<file path=ppt/notesSlides/notesSlide2.xml><?xml version="1.0" encoding="utf-8"?>
+<p:notes xmlns:a="http://schemas.openxmlformats.org/drawingml/2006/main" xmlns:r="http://schemas.openxmlformats.org/officeDocument/2006/relationships" xmlns:p="http://schemas.openxmlformats.org/presentationml/2006/main">
+  <p:cSld>
+    <p:spTree>
+      <p:nvGrpSpPr>
+        <p:cNvPr id="1" name=""/>
+        <p:cNvGrpSpPr/>
+        <p:nvPr/>
+      </p:nvGrpSpPr>
+      <p:grpSpPr>
+        <a:xfrm>
+          <a:off x="0" y="0"/>
+          <a:ext cx="0" cy="0"/>
+          <a:chOff x="0" y="0"/>
+          <a:chExt cx="0" cy="0"/>
+        </a:xfrm>
+      </p:grpSpPr>
+      <p:sp>
+        <p:nvSpPr>
+          <p:cNvPr id="2" name="Slide Image Placeholder 1"/>
+          <p:cNvSpPr>
+            <a:spLocks noGrp="1" noRot="1" noChangeAspect="1"/>
+          </p:cNvSpPr>
+          <p:nvPr>
+            <p:ph type="sldImg"/>
+          </p:nvPr>
+        </p:nvSpPr>
+        <p:spPr/>
+      </p:sp>
+      <p:sp>
+        <p:nvSpPr>
+          <p:cNvPr id="3" name="Notes Placeholder 2"/>
+          <p:cNvSpPr>
+            <a:spLocks noGrp="1"/>
+          </p:cNvSpPr>
+          <p:nvPr>
+            <p:ph type="body" idx="1"/>
+          </p:nvPr>
+        </p:nvSpPr>
+        <p:spPr/>
+        <p:txBody>
+          <a:bodyPr/>
+          <a:lstStyle/>
+          <a:p>
+            <a:r>
+              <a:rPr lang="en-CA" dirty="0"/>
+              <a:t>Q. Ask Yang about using Python</a:t>
+            </a:r>
+          </a:p>
+          <a:p>
+            <a:r>
+              <a:rPr lang="en-CA" dirty="0"/>
+              <a:t>Q. Derived scores from GEMINI (e.g. </a:t>
+            </a:r>
+            <a:r>
+              <a:rPr lang="en-CA" dirty="0" err="1"/>
+              <a:t>Charlston</a:t>
+            </a:r>
+            <a:r>
+              <a:rPr lang="en-CA" dirty="0"/>
+              <a:t>) </a:t>
+            </a:r>
+          </a:p>
+          <a:p>
+            <a:endParaRPr lang="en-US" dirty="0"/>
+          </a:p>
+        </p:txBody>
+      </p:sp>
+      <p:sp>
+        <p:nvSpPr>
+          <p:cNvPr id="4" name="Slide Number Placeholder 3"/>
+          <p:cNvSpPr>
+            <a:spLocks noGrp="1"/>
+          </p:cNvSpPr>
+          <p:nvPr>
+            <p:ph type="sldNum" sz="quarter" idx="5"/>
+          </p:nvPr>
+        </p:nvSpPr>
+        <p:spPr/>
+        <p:txBody>
+          <a:bodyPr/>
+          <a:lstStyle/>
+          <a:p>
+            <a:fld id="{4E3C8D0D-8C50-44EE-9866-8D7C8A5FBCD8}" type="slidenum">
+              <a:rPr lang="en-US" smtClean="0"/>
+              <a:t>4</a:t>
+            </a:fld>
+            <a:endParaRPr lang="en-US"/>
+          </a:p>
+        </p:txBody>
+      </p:sp>
+    </p:spTree>
+    <p:extLst>
+      <p:ext uri="{BB962C8B-B14F-4D97-AF65-F5344CB8AC3E}">
+        <p14:creationId xmlns:p14="http://schemas.microsoft.com/office/powerpoint/2010/main" val="3392918897"/>
+      </p:ext>
+    </p:extLst>
+  </p:cSld>
+  <p:clrMapOvr>
+    <a:masterClrMapping/>
+  </p:clrMapOvr>
+</p:notes>
+</file>
+
+<file path=ppt/notesSlides/notesSlide3.xml><?xml version="1.0" encoding="utf-8"?>
+<p:notes xmlns:a="http://schemas.openxmlformats.org/drawingml/2006/main" xmlns:r="http://schemas.openxmlformats.org/officeDocument/2006/relationships" xmlns:p="http://schemas.openxmlformats.org/presentationml/2006/main">
+  <p:cSld>
+    <p:spTree>
+      <p:nvGrpSpPr>
+        <p:cNvPr id="1" name=""/>
+        <p:cNvGrpSpPr/>
+        <p:nvPr/>
+      </p:nvGrpSpPr>
+      <p:grpSpPr>
+        <a:xfrm>
+          <a:off x="0" y="0"/>
+          <a:ext cx="0" cy="0"/>
+          <a:chOff x="0" y="0"/>
+          <a:chExt cx="0" cy="0"/>
+        </a:xfrm>
+      </p:grpSpPr>
+      <p:sp>
+        <p:nvSpPr>
+          <p:cNvPr id="2" name="Slide Image Placeholder 1"/>
+          <p:cNvSpPr>
+            <a:spLocks noGrp="1" noRot="1" noChangeAspect="1"/>
+          </p:cNvSpPr>
+          <p:nvPr>
+            <p:ph type="sldImg"/>
+          </p:nvPr>
+        </p:nvSpPr>
+        <p:spPr/>
+      </p:sp>
+      <p:sp>
+        <p:nvSpPr>
+          <p:cNvPr id="3" name="Notes Placeholder 2"/>
+          <p:cNvSpPr>
+            <a:spLocks noGrp="1"/>
+          </p:cNvSpPr>
+          <p:nvPr>
+            <p:ph type="body" idx="1"/>
+          </p:nvPr>
+        </p:nvSpPr>
+        <p:spPr/>
+        <p:txBody>
+          <a:bodyPr/>
+          <a:lstStyle/>
+          <a:p>
+            <a:r>
+              <a:rPr lang="en-CA" dirty="0"/>
+              <a:t>1. Pilot user study of 5-6 clinicians to see difficulties/complaints/backlash</a:t>
+            </a:r>
+          </a:p>
+          <a:p>
+            <a:r>
+              <a:rPr lang="en-US" dirty="0"/>
+              <a:t>2. Promoting engagement (+physician champions/leads, comm)</a:t>
+            </a:r>
+          </a:p>
+          <a:p>
+            <a:r>
+              <a:rPr lang="en-US" dirty="0"/>
+              <a:t>3. Tracking engagement (clicks, time spent, a/b testing)</a:t>
+            </a:r>
+          </a:p>
+          <a:p>
+            <a:r>
+              <a:rPr lang="en-US" dirty="0"/>
+              <a:t>4. Give feedback button / textbox</a:t>
+            </a:r>
+          </a:p>
+        </p:txBody>
+      </p:sp>
+      <p:sp>
+        <p:nvSpPr>
+          <p:cNvPr id="4" name="Slide Number Placeholder 3"/>
+          <p:cNvSpPr>
+            <a:spLocks noGrp="1"/>
+          </p:cNvSpPr>
+          <p:nvPr>
+            <p:ph type="sldNum" sz="quarter" idx="5"/>
+          </p:nvPr>
+        </p:nvSpPr>
+        <p:spPr/>
+        <p:txBody>
+          <a:bodyPr/>
+          <a:lstStyle/>
+          <a:p>
+            <a:fld id="{4E3C8D0D-8C50-44EE-9866-8D7C8A5FBCD8}" type="slidenum">
+              <a:rPr lang="en-US" smtClean="0"/>
+              <a:t>6</a:t>
+            </a:fld>
+            <a:endParaRPr lang="en-US"/>
+          </a:p>
+        </p:txBody>
+      </p:sp>
+    </p:spTree>
+    <p:extLst>
+      <p:ext uri="{BB962C8B-B14F-4D97-AF65-F5344CB8AC3E}">
+        <p14:creationId xmlns:p14="http://schemas.microsoft.com/office/powerpoint/2010/main" val="1371217674"/>
+      </p:ext>
+    </p:extLst>
+  </p:cSld>
+  <p:clrMapOvr>
+    <a:masterClrMapping/>
+  </p:clrMapOvr>
+</p:notes>
 </file>
 
 <file path=ppt/slideLayouts/slideLayout1.xml><?xml version="1.0" encoding="utf-8"?>
@@ -4753,7 +5410,7 @@
         <p:spPr>
           <a:xfrm>
             <a:off x="228600" y="1178858"/>
-            <a:ext cx="5273040" cy="4647426"/>
+            <a:ext cx="4458810" cy="4647426"/>
           </a:xfrm>
           <a:prstGeom prst="rect">
             <a:avLst/>
@@ -4881,7 +5538,7 @@
                 <a:effectLst/>
                 <a:latin typeface="Calibri" panose="020F0502020204030204" pitchFamily="34" charset="0"/>
               </a:rPr>
-              <a:t>[ ] Missing data</a:t>
+              <a:t>[ ] Missing data?</a:t>
             </a:r>
           </a:p>
           <a:p>
@@ -4950,8 +5607,8 @@
         </p:nvSpPr>
         <p:spPr>
           <a:xfrm>
-            <a:off x="4958061" y="1178858"/>
-            <a:ext cx="7069818" cy="4770537"/>
+            <a:off x="4687410" y="1178858"/>
+            <a:ext cx="7340469" cy="5509200"/>
           </a:xfrm>
           <a:prstGeom prst="rect">
             <a:avLst/>
@@ -5031,7 +5688,34 @@
               <a:rPr lang="en-CA" sz="2800" dirty="0">
                 <a:latin typeface="Calibri" panose="020F0502020204030204" pitchFamily="34" charset="0"/>
               </a:rPr>
-              <a:t>Order MRP</a:t>
+              <a:t>Ordering MRP</a:t>
+            </a:r>
+            <a:r>
+              <a:rPr lang="en-CA" sz="2800" dirty="0">
+                <a:solidFill>
+                  <a:srgbClr val="FF0000"/>
+                </a:solidFill>
+                <a:latin typeface="Calibri" panose="020F0502020204030204" pitchFamily="34" charset="0"/>
+              </a:rPr>
+              <a:t> (+ </a:t>
+            </a:r>
+            <a:r>
+              <a:rPr lang="en-CA" sz="2800" dirty="0" err="1">
+                <a:solidFill>
+                  <a:srgbClr val="FF0000"/>
+                </a:solidFill>
+                <a:latin typeface="Calibri" panose="020F0502020204030204" pitchFamily="34" charset="0"/>
+              </a:rPr>
+              <a:t>physician_table</a:t>
+            </a:r>
+            <a:r>
+              <a:rPr lang="en-CA" sz="2800" dirty="0">
+                <a:solidFill>
+                  <a:srgbClr val="FF0000"/>
+                </a:solidFill>
+                <a:latin typeface="Calibri" panose="020F0502020204030204" pitchFamily="34" charset="0"/>
+              </a:rPr>
+              <a:t>)</a:t>
             </a:r>
           </a:p>
           <a:p>
@@ -5064,6 +5748,33 @@
             </a:pPr>
             <a:r>
               <a:rPr lang="en-CA" sz="2800" dirty="0">
+                <a:solidFill>
+                  <a:srgbClr val="FF0000"/>
+                </a:solidFill>
+                <a:latin typeface="Calibri" panose="020F0502020204030204" pitchFamily="34" charset="0"/>
+              </a:rPr>
+              <a:t>Product and how much</a:t>
+            </a:r>
+            <a:endParaRPr lang="en-CA" sz="2800" dirty="0">
+              <a:solidFill>
+                <a:srgbClr val="FF0000"/>
+              </a:solidFill>
+              <a:effectLst/>
+              <a:latin typeface="Calibri" panose="020F0502020204030204" pitchFamily="34" charset="0"/>
+            </a:endParaRPr>
+          </a:p>
+          <a:p>
+            <a:pPr marL="742950" marR="0" indent="-742950">
+              <a:spcBef>
+                <a:spcPts val="0"/>
+              </a:spcBef>
+              <a:spcAft>
+                <a:spcPts val="0"/>
+              </a:spcAft>
+              <a:buAutoNum type="arabicPeriod"/>
+            </a:pPr>
+            <a:r>
+              <a:rPr lang="en-CA" sz="2800" dirty="0">
                 <a:effectLst/>
                 <a:latin typeface="Calibri" panose="020F0502020204030204" pitchFamily="34" charset="0"/>
               </a:rPr>
@@ -5081,7 +5792,24 @@
                 <a:effectLst/>
                 <a:latin typeface="Calibri" panose="020F0502020204030204" pitchFamily="34" charset="0"/>
               </a:rPr>
-              <a:t>, INR)</a:t>
+              <a:t>, INR, </a:t>
+            </a:r>
+            <a:r>
+              <a:rPr lang="en-CA" sz="2800" dirty="0">
+                <a:solidFill>
+                  <a:srgbClr val="FF0000"/>
+                </a:solidFill>
+                <a:effectLst/>
+                <a:latin typeface="Calibri" panose="020F0502020204030204" pitchFamily="34" charset="0"/>
+              </a:rPr>
+              <a:t>Albumin</a:t>
+            </a:r>
+            <a:r>
+              <a:rPr lang="en-CA" sz="2800" dirty="0">
+                <a:effectLst/>
+                <a:latin typeface="Calibri" panose="020F0502020204030204" pitchFamily="34" charset="0"/>
+              </a:rPr>
+              <a:t>)</a:t>
             </a:r>
           </a:p>
           <a:p>
@@ -5123,15 +5851,29 @@
               </a:rPr>
               <a:t>Optional: place of order</a:t>
             </a:r>
-            <a:endParaRPr lang="en-CA" sz="2400" dirty="0">
-              <a:solidFill>
-                <a:schemeClr val="bg1">
-                  <a:lumMod val="65000"/>
-                </a:schemeClr>
-              </a:solidFill>
-              <a:effectLst/>
-              <a:latin typeface="Calibri" panose="020F0502020204030204" pitchFamily="34" charset="0"/>
-            </a:endParaRPr>
+          </a:p>
+          <a:p>
+            <a:pPr marL="742950" marR="0" indent="-742950">
+              <a:spcBef>
+                <a:spcPts val="0"/>
+              </a:spcBef>
+              <a:spcAft>
+                <a:spcPts val="0"/>
+              </a:spcAft>
+              <a:buAutoNum type="arabicPeriod"/>
+            </a:pPr>
+            <a:r>
+              <a:rPr lang="en-CA" sz="2400" dirty="0">
+                <a:solidFill>
+                  <a:schemeClr val="bg1">
+                    <a:lumMod val="65000"/>
+                  </a:schemeClr>
+                </a:solidFill>
+                <a:effectLst/>
+                <a:latin typeface="Calibri" panose="020F0502020204030204" pitchFamily="34" charset="0"/>
+              </a:rPr>
+              <a:t>Patient outcomes</a:t>
+            </a:r>
           </a:p>
           <a:p>
             <a:pPr marL="0" marR="0">
@@ -5783,7 +6525,7 @@
         <p:spPr>
           <a:xfrm>
             <a:off x="5620872" y="1039929"/>
-            <a:ext cx="5812646" cy="6001643"/>
+            <a:ext cx="5812646" cy="5878532"/>
           </a:xfrm>
           <a:prstGeom prst="rect">
             <a:avLst/>
@@ -5847,10 +6589,19 @@
               <a:buChar char="•"/>
             </a:pPr>
             <a:r>
-              <a:rPr lang="en-CA" sz="3200" dirty="0">
+              <a:rPr lang="en-CA" sz="2800" dirty="0">
                 <a:latin typeface="Calibri" panose="020F0502020204030204" pitchFamily="34" charset="0"/>
               </a:rPr>
               <a:t>R or Python? </a:t>
+            </a:r>
+            <a:r>
+              <a:rPr lang="en-CA" sz="2800" dirty="0">
+                <a:solidFill>
+                  <a:srgbClr val="FF0000"/>
+                </a:solidFill>
+                <a:latin typeface="Calibri" panose="020F0502020204030204" pitchFamily="34" charset="0"/>
+              </a:rPr>
+              <a:t>Python</a:t>
             </a:r>
           </a:p>
           <a:p>
@@ -5862,7 +6613,7 @@
                 <a:spcPts val="0"/>
               </a:spcAft>
             </a:pPr>
-            <a:endParaRPr lang="en-CA" sz="2800" b="1" dirty="0">
+            <a:endParaRPr lang="en-CA" sz="2400" b="1" dirty="0">
               <a:effectLst/>
               <a:latin typeface="Calibri" panose="020F0502020204030204" pitchFamily="34" charset="0"/>
             </a:endParaRPr>
@@ -5879,7 +6630,7 @@
               <a:buChar char="•"/>
             </a:pPr>
             <a:r>
-              <a:rPr lang="en-CA" sz="2800" dirty="0">
+              <a:rPr lang="en-CA" sz="2400" dirty="0">
                 <a:latin typeface="Calibri" panose="020F0502020204030204" pitchFamily="34" charset="0"/>
               </a:rPr>
               <a:t>Algorithm Choices</a:t>
@@ -5891,10 +6642,16 @@
               <a:buChar char="•"/>
             </a:pPr>
             <a:r>
-              <a:rPr lang="en-CA" sz="2800" dirty="0">
-                <a:latin typeface="Calibri" panose="020F0502020204030204" pitchFamily="34" charset="0"/>
-              </a:rPr>
-              <a:t>Defining appropriateness</a:t>
+              <a:rPr lang="en-CA" sz="2400" dirty="0">
+                <a:latin typeface="Calibri" panose="020F0502020204030204" pitchFamily="34" charset="0"/>
+              </a:rPr>
+              <a:t>Defining </a:t>
+            </a:r>
+            <a:r>
+              <a:rPr lang="en-CA" sz="2400" b="1" dirty="0">
+                <a:latin typeface="Calibri" panose="020F0502020204030204" pitchFamily="34" charset="0"/>
+              </a:rPr>
+              <a:t>appropriateness</a:t>
             </a:r>
           </a:p>
           <a:p>
@@ -5903,7 +6660,7 @@
               <a:buChar char="•"/>
             </a:pPr>
             <a:r>
-              <a:rPr lang="en-CA" sz="2800" dirty="0">
+              <a:rPr lang="en-CA" sz="2400" dirty="0">
                 <a:effectLst/>
                 <a:latin typeface="Calibri" panose="020F0502020204030204" pitchFamily="34" charset="0"/>
               </a:rPr>
@@ -5916,7 +6673,7 @@
               <a:buChar char="•"/>
             </a:pPr>
             <a:r>
-              <a:rPr lang="en-CA" sz="2800" dirty="0">
+              <a:rPr lang="en-CA" sz="2400" dirty="0">
                 <a:latin typeface="Calibri" panose="020F0502020204030204" pitchFamily="34" charset="0"/>
               </a:rPr>
               <a:t>Selecting exceptions (dynamic)</a:t>
@@ -5924,7 +6681,7 @@
           </a:p>
           <a:p>
             <a:pPr lvl="1"/>
-            <a:endParaRPr lang="en-CA" sz="2800" dirty="0">
+            <a:endParaRPr lang="en-CA" sz="2400" dirty="0">
               <a:effectLst/>
               <a:latin typeface="Calibri" panose="020F0502020204030204" pitchFamily="34" charset="0"/>
             </a:endParaRPr>
@@ -5941,7 +6698,7 @@
               <a:buChar char="•"/>
             </a:pPr>
             <a:r>
-              <a:rPr lang="en-CA" sz="2800" dirty="0">
+              <a:rPr lang="en-CA" sz="2400" dirty="0">
                 <a:latin typeface="Calibri" panose="020F0502020204030204" pitchFamily="34" charset="0"/>
               </a:rPr>
               <a:t>Data Issues</a:t>
@@ -5953,7 +6710,7 @@
               <a:buChar char="•"/>
             </a:pPr>
             <a:r>
-              <a:rPr lang="en-CA" sz="2800" dirty="0">
+              <a:rPr lang="en-CA" sz="2400" dirty="0">
                 <a:latin typeface="Calibri" panose="020F0502020204030204" pitchFamily="34" charset="0"/>
               </a:rPr>
               <a:t>Sample size cut-offs</a:t>
@@ -5965,24 +6722,29 @@
               <a:buChar char="•"/>
             </a:pPr>
             <a:r>
-              <a:rPr lang="en-CA" sz="2800" dirty="0">
+              <a:rPr lang="en-CA" sz="2400" dirty="0">
                 <a:latin typeface="Calibri" panose="020F0502020204030204" pitchFamily="34" charset="0"/>
               </a:rPr>
               <a:t>Considering data cut-offs</a:t>
             </a:r>
           </a:p>
           <a:p>
-            <a:pPr marR="0">
-              <a:spcBef>
-                <a:spcPts val="0"/>
-              </a:spcBef>
-              <a:spcAft>
-                <a:spcPts val="0"/>
-              </a:spcAft>
-            </a:pPr>
-            <a:endParaRPr lang="en-CA" sz="2800" dirty="0">
+            <a:pPr lvl="1"/>
+            <a:endParaRPr lang="en-CA" sz="2400" dirty="0">
               <a:latin typeface="Calibri" panose="020F0502020204030204" pitchFamily="34" charset="0"/>
             </a:endParaRPr>
+          </a:p>
+          <a:p>
+            <a:pPr lvl="1"/>
+            <a:r>
+              <a:rPr lang="en-CA" sz="2400" b="1" dirty="0">
+                <a:solidFill>
+                  <a:srgbClr val="FF0000"/>
+                </a:solidFill>
+                <a:latin typeface="Calibri" panose="020F0502020204030204" pitchFamily="34" charset="0"/>
+              </a:rPr>
+              <a:t>Analysis of Transfusions Per Days of Service Per Patient</a:t>
+            </a:r>
           </a:p>
         </p:txBody>
       </p:sp>
@@ -6683,7 +7445,7 @@
           <p:nvPr/>
         </p:nvPicPr>
         <p:blipFill>
-          <a:blip r:embed="rId2"/>
+          <a:blip r:embed="rId3"/>
           <a:stretch>
             <a:fillRect/>
           </a:stretch>
@@ -6713,7 +7475,7 @@
           <p:nvPr/>
         </p:nvPicPr>
         <p:blipFill>
-          <a:blip r:embed="rId3"/>
+          <a:blip r:embed="rId4"/>
           <a:stretch>
             <a:fillRect/>
           </a:stretch>
@@ -6742,8 +7504,8 @@
         </p:nvSpPr>
         <p:spPr>
           <a:xfrm>
-            <a:off x="5930154" y="1972358"/>
-            <a:ext cx="6261846" cy="3231654"/>
+            <a:off x="5930155" y="1804228"/>
+            <a:ext cx="6261846" cy="3539430"/>
           </a:xfrm>
           <a:prstGeom prst="rect">
             <a:avLst/>
@@ -6768,7 +7530,22 @@
             </a:r>
           </a:p>
           <a:p>
-            <a:pPr marL="285750" indent="-285750">
+            <a:pPr marL="742950" lvl="1" indent="-285750">
+              <a:buFont typeface="Arial" panose="020B0604020202020204" pitchFamily="34" charset="0"/>
+              <a:buChar char="•"/>
+            </a:pPr>
+            <a:r>
+              <a:rPr lang="en-CA" sz="2000" b="1" dirty="0">
+                <a:solidFill>
+                  <a:srgbClr val="FF0000"/>
+                </a:solidFill>
+                <a:latin typeface="Calibri" panose="020F0502020204030204" pitchFamily="34" charset="0"/>
+              </a:rPr>
+              <a:t>+ Pilot User study</a:t>
+            </a:r>
+          </a:p>
+          <a:p>
+            <a:pPr marL="742950" lvl="1" indent="-285750">
               <a:buFont typeface="Arial" panose="020B0604020202020204" pitchFamily="34" charset="0"/>
               <a:buChar char="•"/>
             </a:pPr>
@@ -8288,4 +9065,299 @@
     </a:ext>
   </a:extLst>
 </a:theme>
+</file>
+
+<file path=ppt/theme/theme2.xml><?xml version="1.0" encoding="utf-8"?>
+<a:theme xmlns:a="http://schemas.openxmlformats.org/drawingml/2006/main" name="Office Theme">
+  <a:themeElements>
+    <a:clrScheme name="Office">
+      <a:dk1>
+        <a:sysClr val="windowText" lastClr="000000"/>
+      </a:dk1>
+      <a:lt1>
+        <a:sysClr val="window" lastClr="FFFFFF"/>
+      </a:lt1>
+      <a:dk2>
+        <a:srgbClr val="44546A"/>
+      </a:dk2>
+      <a:lt2>
+        <a:srgbClr val="E7E6E6"/>
+      </a:lt2>
+      <a:accent1>
+        <a:srgbClr val="4472C4"/>
+      </a:accent1>
+      <a:accent2>
+        <a:srgbClr val="ED7D31"/>
+      </a:accent2>
+      <a:accent3>
+        <a:srgbClr val="A5A5A5"/>
+      </a:accent3>
+      <a:accent4>
+        <a:srgbClr val="FFC000"/>
+      </a:accent4>
+      <a:accent5>
+        <a:srgbClr val="5B9BD5"/>
+      </a:accent5>
+      <a:accent6>
+        <a:srgbClr val="70AD47"/>
+      </a:accent6>
+      <a:hlink>
+        <a:srgbClr val="0563C1"/>
+      </a:hlink>
+      <a:folHlink>
+        <a:srgbClr val="954F72"/>
+      </a:folHlink>
+    </a:clrScheme>
+    <a:fontScheme name="Office">
+      <a:majorFont>
+        <a:latin typeface="Calibri Light" panose="020F0302020204030204"/>
+        <a:ea typeface=""/>
+        <a:cs typeface=""/>
+        <a:font script="Jpan" typeface="游ゴシック Light"/>
+        <a:font script="Hang" typeface="맑은 고딕"/>
+        <a:font script="Hans" typeface="等线 Light"/>
+        <a:font script="Hant" typeface="新細明體"/>
+        <a:font script="Arab" typeface="Times New Roman"/>
+        <a:font script="Hebr" typeface="Times New Roman"/>
+        <a:font script="Thai" typeface="Angsana New"/>
+        <a:font script="Ethi" typeface="Nyala"/>
+        <a:font script="Beng" typeface="Vrinda"/>
+        <a:font script="Gujr" typeface="Shruti"/>
+        <a:font script="Khmr" typeface="MoolBoran"/>
+        <a:font script="Knda" typeface="Tunga"/>
+        <a:font script="Guru" typeface="Raavi"/>
+        <a:font script="Cans" typeface="Euphemia"/>
+        <a:font script="Cher" typeface="Plantagenet Cherokee"/>
+        <a:font script="Yiii" typeface="Microsoft Yi Baiti"/>
+        <a:font script="Tibt" typeface="Microsoft Himalaya"/>
+        <a:font script="Thaa" typeface="MV Boli"/>
+        <a:font script="Deva" typeface="Mangal"/>
+        <a:font script="Telu" typeface="Gautami"/>
+        <a:font script="Taml" typeface="Latha"/>
+        <a:font script="Syrc" typeface="Estrangelo Edessa"/>
+        <a:font script="Orya" typeface="Kalinga"/>
+        <a:font script="Mlym" typeface="Kartika"/>
+        <a:font script="Laoo" typeface="DokChampa"/>
+        <a:font script="Sinh" typeface="Iskoola Pota"/>
+        <a:font script="Mong" typeface="Mongolian Baiti"/>
+        <a:font script="Viet" typeface="Times New Roman"/>
+        <a:font script="Uigh" typeface="Microsoft Uighur"/>
+        <a:font script="Geor" typeface="Sylfaen"/>
+        <a:font script="Armn" typeface="Arial"/>
+        <a:font script="Bugi" typeface="Leelawadee UI"/>
+        <a:font script="Bopo" typeface="Microsoft JhengHei"/>
+        <a:font script="Java" typeface="Javanese Text"/>
+        <a:font script="Lisu" typeface="Segoe UI"/>
+        <a:font script="Mymr" typeface="Myanmar Text"/>
+        <a:font script="Nkoo" typeface="Ebrima"/>
+        <a:font script="Olck" typeface="Nirmala UI"/>
+        <a:font script="Osma" typeface="Ebrima"/>
+        <a:font script="Phag" typeface="Phagspa"/>
+        <a:font script="Syrn" typeface="Estrangelo Edessa"/>
+        <a:font script="Syrj" typeface="Estrangelo Edessa"/>
+        <a:font script="Syre" typeface="Estrangelo Edessa"/>
+        <a:font script="Sora" typeface="Nirmala UI"/>
+        <a:font script="Tale" typeface="Microsoft Tai Le"/>
+        <a:font script="Talu" typeface="Microsoft New Tai Lue"/>
+        <a:font script="Tfng" typeface="Ebrima"/>
+      </a:majorFont>
+      <a:minorFont>
+        <a:latin typeface="Calibri" panose="020F0502020204030204"/>
+        <a:ea typeface=""/>
+        <a:cs typeface=""/>
+        <a:font script="Jpan" typeface="游ゴシック"/>
+        <a:font script="Hang" typeface="맑은 고딕"/>
+        <a:font script="Hans" typeface="等线"/>
+        <a:font script="Hant" typeface="新細明體"/>
+        <a:font script="Arab" typeface="Arial"/>
+        <a:font script="Hebr" typeface="Arial"/>
+        <a:font script="Thai" typeface="Cordia New"/>
+        <a:font script="Ethi" typeface="Nyala"/>
+        <a:font script="Beng" typeface="Vrinda"/>
+        <a:font script="Gujr" typeface="Shruti"/>
+        <a:font script="Khmr" typeface="DaunPenh"/>
+        <a:font script="Knda" typeface="Tunga"/>
+        <a:font script="Guru" typeface="Raavi"/>
+        <a:font script="Cans" typeface="Euphemia"/>
+        <a:font script="Cher" typeface="Plantagenet Cherokee"/>
+        <a:font script="Yiii" typeface="Microsoft Yi Baiti"/>
+        <a:font script="Tibt" typeface="Microsoft Himalaya"/>
+        <a:font script="Thaa" typeface="MV Boli"/>
+        <a:font script="Deva" typeface="Mangal"/>
+        <a:font script="Telu" typeface="Gautami"/>
+        <a:font script="Taml" typeface="Latha"/>
+        <a:font script="Syrc" typeface="Estrangelo Edessa"/>
+        <a:font script="Orya" typeface="Kalinga"/>
+        <a:font script="Mlym" typeface="Kartika"/>
+        <a:font script="Laoo" typeface="DokChampa"/>
+        <a:font script="Sinh" typeface="Iskoola Pota"/>
+        <a:font script="Mong" typeface="Mongolian Baiti"/>
+        <a:font script="Viet" typeface="Arial"/>
+        <a:font script="Uigh" typeface="Microsoft Uighur"/>
+        <a:font script="Geor" typeface="Sylfaen"/>
+        <a:font script="Armn" typeface="Arial"/>
+        <a:font script="Bugi" typeface="Leelawadee UI"/>
+        <a:font script="Bopo" typeface="Microsoft JhengHei"/>
+        <a:font script="Java" typeface="Javanese Text"/>
+        <a:font script="Lisu" typeface="Segoe UI"/>
+        <a:font script="Mymr" typeface="Myanmar Text"/>
+        <a:font script="Nkoo" typeface="Ebrima"/>
+        <a:font script="Olck" typeface="Nirmala UI"/>
+        <a:font script="Osma" typeface="Ebrima"/>
+        <a:font script="Phag" typeface="Phagspa"/>
+        <a:font script="Syrn" typeface="Estrangelo Edessa"/>
+        <a:font script="Syrj" typeface="Estrangelo Edessa"/>
+        <a:font script="Syre" typeface="Estrangelo Edessa"/>
+        <a:font script="Sora" typeface="Nirmala UI"/>
+        <a:font script="Tale" typeface="Microsoft Tai Le"/>
+        <a:font script="Talu" typeface="Microsoft New Tai Lue"/>
+        <a:font script="Tfng" typeface="Ebrima"/>
+      </a:minorFont>
+    </a:fontScheme>
+    <a:fmtScheme name="Office">
+      <a:fillStyleLst>
+        <a:solidFill>
+          <a:schemeClr val="phClr"/>
+        </a:solidFill>
+        <a:gradFill rotWithShape="1">
+          <a:gsLst>
+            <a:gs pos="0">
+              <a:schemeClr val="phClr">
+                <a:lumMod val="110000"/>
+                <a:satMod val="105000"/>
+                <a:tint val="67000"/>
+              </a:schemeClr>
+            </a:gs>
+            <a:gs pos="50000">
+              <a:schemeClr val="phClr">
+                <a:lumMod val="105000"/>
+                <a:satMod val="103000"/>
+                <a:tint val="73000"/>
+              </a:schemeClr>
+            </a:gs>
+            <a:gs pos="100000">
+              <a:schemeClr val="phClr">
+                <a:lumMod val="105000"/>
+                <a:satMod val="109000"/>
+                <a:tint val="81000"/>
+              </a:schemeClr>
+            </a:gs>
+          </a:gsLst>
+          <a:lin ang="5400000" scaled="0"/>
+        </a:gradFill>
+        <a:gradFill rotWithShape="1">
+          <a:gsLst>
+            <a:gs pos="0">
+              <a:schemeClr val="phClr">
+                <a:satMod val="103000"/>
+                <a:lumMod val="102000"/>
+                <a:tint val="94000"/>
+              </a:schemeClr>
+            </a:gs>
+            <a:gs pos="50000">
+              <a:schemeClr val="phClr">
+                <a:satMod val="110000"/>
+                <a:lumMod val="100000"/>
+                <a:shade val="100000"/>
+              </a:schemeClr>
+            </a:gs>
+            <a:gs pos="100000">
+              <a:schemeClr val="phClr">
+                <a:lumMod val="99000"/>
+                <a:satMod val="120000"/>
+                <a:shade val="78000"/>
+              </a:schemeClr>
+            </a:gs>
+          </a:gsLst>
+          <a:lin ang="5400000" scaled="0"/>
+        </a:gradFill>
+      </a:fillStyleLst>
+      <a:lnStyleLst>
+        <a:ln w="6350" cap="flat" cmpd="sng" algn="ctr">
+          <a:solidFill>
+            <a:schemeClr val="phClr"/>
+          </a:solidFill>
+          <a:prstDash val="solid"/>
+          <a:miter lim="800000"/>
+        </a:ln>
+        <a:ln w="12700" cap="flat" cmpd="sng" algn="ctr">
+          <a:solidFill>
+            <a:schemeClr val="phClr"/>
+          </a:solidFill>
+          <a:prstDash val="solid"/>
+          <a:miter lim="800000"/>
+        </a:ln>
+        <a:ln w="19050" cap="flat" cmpd="sng" algn="ctr">
+          <a:solidFill>
+            <a:schemeClr val="phClr"/>
+          </a:solidFill>
+          <a:prstDash val="solid"/>
+          <a:miter lim="800000"/>
+        </a:ln>
+      </a:lnStyleLst>
+      <a:effectStyleLst>
+        <a:effectStyle>
+          <a:effectLst/>
+        </a:effectStyle>
+        <a:effectStyle>
+          <a:effectLst/>
+        </a:effectStyle>
+        <a:effectStyle>
+          <a:effectLst>
+            <a:outerShdw blurRad="57150" dist="19050" dir="5400000" algn="ctr" rotWithShape="0">
+              <a:srgbClr val="000000">
+                <a:alpha val="63000"/>
+              </a:srgbClr>
+            </a:outerShdw>
+          </a:effectLst>
+        </a:effectStyle>
+      </a:effectStyleLst>
+      <a:bgFillStyleLst>
+        <a:solidFill>
+          <a:schemeClr val="phClr"/>
+        </a:solidFill>
+        <a:solidFill>
+          <a:schemeClr val="phClr">
+            <a:tint val="95000"/>
+            <a:satMod val="170000"/>
+          </a:schemeClr>
+        </a:solidFill>
+        <a:gradFill rotWithShape="1">
+          <a:gsLst>
+            <a:gs pos="0">
+              <a:schemeClr val="phClr">
+                <a:tint val="93000"/>
+                <a:satMod val="150000"/>
+                <a:shade val="98000"/>
+                <a:lumMod val="102000"/>
+              </a:schemeClr>
+            </a:gs>
+            <a:gs pos="50000">
+              <a:schemeClr val="phClr">
+                <a:tint val="98000"/>
+                <a:satMod val="130000"/>
+                <a:shade val="90000"/>
+                <a:lumMod val="103000"/>
+              </a:schemeClr>
+            </a:gs>
+            <a:gs pos="100000">
+              <a:schemeClr val="phClr">
+                <a:shade val="63000"/>
+                <a:satMod val="120000"/>
+              </a:schemeClr>
+            </a:gs>
+          </a:gsLst>
+          <a:lin ang="5400000" scaled="0"/>
+        </a:gradFill>
+      </a:bgFillStyleLst>
+    </a:fmtScheme>
+  </a:themeElements>
+  <a:objectDefaults/>
+  <a:extraClrSchemeLst/>
+  <a:extLst>
+    <a:ext uri="{05A4C25C-085E-4340-85A3-A5531E510DB2}">
+      <thm15:themeFamily xmlns:thm15="http://schemas.microsoft.com/office/thememl/2012/main" name="Office Theme" id="{62F939B6-93AF-4DB8-9C6B-D6C7DFDC589F}" vid="{4A3C46E8-61CC-4603-A589-7422A47A8E4A}"/>
+    </a:ext>
+  </a:extLst>
+</a:theme>
 </file>
</xml_diff>